<commit_message>
Added something on PPT
</commit_message>
<xml_diff>
--- a/Presentation/presentation.pptx
+++ b/Presentation/presentation.pptx
@@ -5,12 +5,16 @@
     <p:sldMasterId id="2147483998" r:id="rId1"/>
   </p:sldMasterIdLst>
   <p:notesMasterIdLst>
-    <p:notesMasterId r:id="rId5"/>
+    <p:notesMasterId r:id="rId9"/>
   </p:notesMasterIdLst>
   <p:sldIdLst>
     <p:sldId id="256" r:id="rId2"/>
     <p:sldId id="257" r:id="rId3"/>
     <p:sldId id="258" r:id="rId4"/>
+    <p:sldId id="259" r:id="rId5"/>
+    <p:sldId id="260" r:id="rId6"/>
+    <p:sldId id="261" r:id="rId7"/>
+    <p:sldId id="262" r:id="rId8"/>
   </p:sldIdLst>
   <p:sldSz cx="9144000" cy="6858000" type="screen4x3"/>
   <p:notesSz cx="7010400" cy="9296400"/>
@@ -109,6 +113,22 @@
       </a:defRPr>
     </a:lvl9pPr>
   </p:defaultTextStyle>
+  <p:extLst>
+    <p:ext uri="{EFAFB233-063F-42B5-8137-9DF3F51BA10A}">
+      <p15:sldGuideLst xmlns:p15="http://schemas.microsoft.com/office/powerpoint/2012/main">
+        <p15:guide id="1" orient="horz" pos="2160">
+          <p15:clr>
+            <a:srgbClr val="A4A3A4"/>
+          </p15:clr>
+        </p15:guide>
+        <p15:guide id="2" pos="2880">
+          <p15:clr>
+            <a:srgbClr val="A4A3A4"/>
+          </p15:clr>
+        </p15:guide>
+      </p15:sldGuideLst>
+    </p:ext>
+  </p:extLst>
 </p:presentation>
 </file>
 
@@ -200,7 +220,7 @@
           <a:p>
             <a:fld id="{9EC04C0B-C3F3-154E-937E-9CF7C163CE16}" type="datetimeFigureOut">
               <a:rPr lang="en-US" smtClean="0"/>
-              <a:t>4/17/17</a:t>
+              <a:t>4/18/2017</a:t>
             </a:fld>
             <a:endParaRPr lang="en-US"/>
           </a:p>
@@ -469,7 +489,7 @@
 </file>
 
 <file path=ppt/slideLayouts/slideLayout1.xml><?xml version="1.0" encoding="utf-8"?>
-<p:sldLayout xmlns:a="http://schemas.openxmlformats.org/drawingml/2006/main" xmlns:r="http://schemas.openxmlformats.org/officeDocument/2006/relationships" xmlns:p="http://schemas.openxmlformats.org/presentationml/2006/main" showMasterSp="0" type="title" preserve="1">
+<p:sldLayout xmlns:a="http://schemas.openxmlformats.org/drawingml/2006/main" xmlns:r="http://schemas.openxmlformats.org/officeDocument/2006/relationships" xmlns:p="http://schemas.openxmlformats.org/presentationml/2006/main" type="title" preserve="1">
   <p:cSld name="Title Slide">
     <p:spTree>
       <p:nvGrpSpPr>
@@ -670,7 +690,7 @@
             <a:fld id="{04AF466F-BDA4-4F18-9C7B-FF0A9A1B0E80}" type="datetime1">
               <a:rPr lang="en-US" smtClean="0"/>
               <a:pPr/>
-              <a:t>4/17/17</a:t>
+              <a:t>4/18/2017</a:t>
             </a:fld>
             <a:endParaRPr lang="en-US"/>
           </a:p>
@@ -1125,7 +1145,7 @@
             <a:fld id="{327B613C-1AD7-49D3-885D-F654C5CDBAA6}" type="datetime1">
               <a:rPr lang="en-US" smtClean="0"/>
               <a:pPr/>
-              <a:t>4/17/17</a:t>
+              <a:t>4/18/2017</a:t>
             </a:fld>
             <a:endParaRPr lang="en-US" dirty="0"/>
           </a:p>
@@ -1671,7 +1691,7 @@
             <a:fld id="{02B28685-4D0C-42D5-8013-B5904CD1FCBC}" type="datetime1">
               <a:rPr lang="en-US" smtClean="0"/>
               <a:pPr/>
-              <a:t>4/17/17</a:t>
+              <a:t>4/18/2017</a:t>
             </a:fld>
             <a:endParaRPr lang="en-US"/>
           </a:p>
@@ -1809,7 +1829,7 @@
             <a:fld id="{FDF226C0-9885-4BA9-BBFA-A52CBFEBB775}" type="datetime1">
               <a:rPr lang="en-US" smtClean="0"/>
               <a:pPr/>
-              <a:t>4/17/17</a:t>
+              <a:t>4/18/2017</a:t>
             </a:fld>
             <a:endParaRPr lang="en-US"/>
           </a:p>
@@ -2149,7 +2169,7 @@
             <a:fld id="{EBEE1B38-C5EB-4D66-9137-0AFE9CDEDE8F}" type="datetime1">
               <a:rPr lang="en-US" smtClean="0"/>
               <a:pPr/>
-              <a:t>4/17/17</a:t>
+              <a:t>4/18/2017</a:t>
             </a:fld>
             <a:endParaRPr lang="en-US"/>
           </a:p>
@@ -2476,7 +2496,7 @@
             <a:fld id="{327B613C-1AD7-49D3-885D-F654C5CDBAA6}" type="datetime1">
               <a:rPr lang="en-US" smtClean="0"/>
               <a:pPr/>
-              <a:t>4/17/17</a:t>
+              <a:t>4/18/2017</a:t>
             </a:fld>
             <a:endParaRPr lang="en-US" dirty="0"/>
           </a:p>
@@ -2776,7 +2796,7 @@
             <a:fld id="{327B613C-1AD7-49D3-885D-F654C5CDBAA6}" type="datetime1">
               <a:rPr lang="en-US" smtClean="0"/>
               <a:pPr/>
-              <a:t>4/17/17</a:t>
+              <a:t>4/18/2017</a:t>
             </a:fld>
             <a:endParaRPr lang="en-US" dirty="0"/>
           </a:p>
@@ -3166,7 +3186,7 @@
             <a:fld id="{327B613C-1AD7-49D3-885D-F654C5CDBAA6}" type="datetime1">
               <a:rPr lang="en-US" smtClean="0"/>
               <a:pPr/>
-              <a:t>4/17/17</a:t>
+              <a:t>4/18/2017</a:t>
             </a:fld>
             <a:endParaRPr lang="en-US" dirty="0"/>
           </a:p>
@@ -3589,7 +3609,7 @@
             <a:fld id="{327B613C-1AD7-49D3-885D-F654C5CDBAA6}" type="datetime1">
               <a:rPr lang="en-US" smtClean="0"/>
               <a:pPr/>
-              <a:t>4/17/17</a:t>
+              <a:t>4/18/2017</a:t>
             </a:fld>
             <a:endParaRPr lang="en-US" dirty="0"/>
           </a:p>
@@ -4140,7 +4160,7 @@
             <a:fld id="{327B613C-1AD7-49D3-885D-F654C5CDBAA6}" type="datetime1">
               <a:rPr lang="en-US" smtClean="0"/>
               <a:pPr/>
-              <a:t>4/17/17</a:t>
+              <a:t>4/18/2017</a:t>
             </a:fld>
             <a:endParaRPr lang="en-US" dirty="0"/>
           </a:p>
@@ -4501,7 +4521,7 @@
             <a:fld id="{58FB4290-6522-4139-852E-05BD9E7F0D2E}" type="datetime1">
               <a:rPr lang="en-US" smtClean="0"/>
               <a:pPr/>
-              <a:t>4/17/17</a:t>
+              <a:t>4/18/2017</a:t>
             </a:fld>
             <a:endParaRPr lang="en-US"/>
           </a:p>
@@ -4718,7 +4738,7 @@
             <a:fld id="{1CEF607B-A47E-422C-9BEF-122CCDB7C526}" type="datetime1">
               <a:rPr lang="en-US" smtClean="0"/>
               <a:pPr/>
-              <a:t>4/17/17</a:t>
+              <a:t>4/18/2017</a:t>
             </a:fld>
             <a:endParaRPr lang="en-US"/>
           </a:p>
@@ -5027,7 +5047,7 @@
             <a:fld id="{AAB955F9-81EA-47C5-8059-9E5C2B437C70}" type="datetime1">
               <a:rPr lang="en-US" smtClean="0"/>
               <a:pPr/>
-              <a:t>4/17/17</a:t>
+              <a:t>4/18/2017</a:t>
             </a:fld>
             <a:endParaRPr lang="en-US"/>
           </a:p>
@@ -5285,7 +5305,7 @@
             <a:fld id="{327B613C-1AD7-49D3-885D-F654C5CDBAA6}" type="datetime1">
               <a:rPr lang="en-US" smtClean="0"/>
               <a:pPr/>
-              <a:t>4/17/17</a:t>
+              <a:t>4/18/2017</a:t>
             </a:fld>
             <a:endParaRPr lang="en-US" dirty="0"/>
           </a:p>
@@ -5677,7 +5697,7 @@
             <a:fld id="{327B613C-1AD7-49D3-885D-F654C5CDBAA6}" type="datetime1">
               <a:rPr lang="en-US" smtClean="0"/>
               <a:pPr/>
-              <a:t>4/17/17</a:t>
+              <a:t>4/18/2017</a:t>
             </a:fld>
             <a:endParaRPr lang="en-US" dirty="0"/>
           </a:p>
@@ -6268,7 +6288,7 @@
             <a:fld id="{63A9A7CB-BEE6-4F99-898E-913F06E8E125}" type="datetime1">
               <a:rPr lang="en-US" smtClean="0"/>
               <a:pPr/>
-              <a:t>4/17/17</a:t>
+              <a:t>4/18/2017</a:t>
             </a:fld>
             <a:endParaRPr lang="en-US"/>
           </a:p>
@@ -6785,7 +6805,7 @@
             <a:fld id="{B6EE300C-6FC5-4FC3-AF1A-075E4F50620D}" type="datetime1">
               <a:rPr lang="en-US" smtClean="0"/>
               <a:pPr/>
-              <a:t>4/17/17</a:t>
+              <a:t>4/18/2017</a:t>
             </a:fld>
             <a:endParaRPr lang="en-US"/>
           </a:p>
@@ -7160,7 +7180,7 @@
             <a:fld id="{F50D295D-4A77-4DEB-B04C-9F4282A8BC04}" type="datetime1">
               <a:rPr lang="en-US" smtClean="0"/>
               <a:pPr/>
-              <a:t>4/17/17</a:t>
+              <a:t>4/18/2017</a:t>
             </a:fld>
             <a:endParaRPr lang="en-US"/>
           </a:p>
@@ -7561,7 +7581,7 @@
             <a:fld id="{327B613C-1AD7-49D3-885D-F654C5CDBAA6}" type="datetime1">
               <a:rPr lang="en-US" smtClean="0"/>
               <a:pPr/>
-              <a:t>4/17/17</a:t>
+              <a:t>4/18/2017</a:t>
             </a:fld>
             <a:endParaRPr lang="en-US" dirty="0"/>
           </a:p>
@@ -7984,7 +8004,7 @@
             <a:fld id="{327B613C-1AD7-49D3-885D-F654C5CDBAA6}" type="datetime1">
               <a:rPr lang="en-US" smtClean="0"/>
               <a:pPr/>
-              <a:t>4/17/17</a:t>
+              <a:t>4/18/2017</a:t>
             </a:fld>
             <a:endParaRPr lang="en-US" dirty="0"/>
           </a:p>
@@ -8220,9 +8240,17 @@
 <p:sldMaster xmlns:a="http://schemas.openxmlformats.org/drawingml/2006/main" xmlns:r="http://schemas.openxmlformats.org/officeDocument/2006/relationships" xmlns:p="http://schemas.openxmlformats.org/presentationml/2006/main">
   <p:cSld>
     <p:bg>
-      <p:bgRef idx="1001">
-        <a:schemeClr val="bg1"/>
-      </p:bgRef>
+      <p:bgPr>
+        <a:pattFill prst="pct5">
+          <a:fgClr>
+            <a:schemeClr val="accent1"/>
+          </a:fgClr>
+          <a:bgClr>
+            <a:schemeClr val="bg1"/>
+          </a:bgClr>
+        </a:pattFill>
+        <a:effectLst/>
+      </p:bgPr>
     </p:bg>
     <p:spTree>
       <p:nvGrpSpPr>
@@ -8370,7 +8398,7 @@
             <a:fld id="{327B613C-1AD7-49D3-885D-F654C5CDBAA6}" type="datetime1">
               <a:rPr lang="en-US" smtClean="0"/>
               <a:pPr/>
-              <a:t>4/17/17</a:t>
+              <a:t>4/18/2017</a:t>
             </a:fld>
             <a:endParaRPr lang="en-US" dirty="0"/>
           </a:p>
@@ -8849,11 +8877,7 @@
           <a:p>
             <a:r>
               <a:rPr lang="en-US" sz="3200" dirty="0" smtClean="0"/>
-              <a:t>S</a:t>
-            </a:r>
-            <a:r>
-              <a:rPr lang="en-US" sz="3200" dirty="0" smtClean="0"/>
-              <a:t>calable Data Center Simulation</a:t>
+              <a:t>Scalable Data Center Simulation</a:t>
             </a:r>
             <a:endParaRPr lang="en-US" sz="3200" dirty="0"/>
           </a:p>
@@ -9017,7 +9041,7 @@
           </p:nvPr>
         </p:nvPicPr>
         <p:blipFill>
-          <a:blip r:embed="rId2">
+          <a:blip r:embed="rId2" cstate="email">
             <a:extLst>
               <a:ext uri="{28A0092B-C50C-407E-A947-70E740481C1C}">
                 <a14:useLocalDpi xmlns:a14="http://schemas.microsoft.com/office/drawing/2010/main" val="0"/>
@@ -9118,11 +9142,7 @@
           <a:p>
             <a:r>
               <a:rPr lang="en-US" dirty="0" smtClean="0"/>
-              <a:t>F</a:t>
-            </a:r>
-            <a:r>
-              <a:rPr lang="en-US" dirty="0" smtClean="0"/>
-              <a:t>at-Tree Data Center Topology</a:t>
+              <a:t>Fat-Tree Data Center Topology</a:t>
             </a:r>
             <a:endParaRPr lang="en-US" dirty="0"/>
           </a:p>
@@ -9139,7 +9159,7 @@
           </p:nvPr>
         </p:nvPicPr>
         <p:blipFill>
-          <a:blip r:embed="rId2">
+          <a:blip r:embed="rId2" cstate="email">
             <a:extLst>
               <a:ext uri="{28A0092B-C50C-407E-A947-70E740481C1C}">
                 <a14:useLocalDpi xmlns:a14="http://schemas.microsoft.com/office/drawing/2010/main" val="0"/>
@@ -9185,6 +9205,742 @@
     <p:extLst>
       <p:ext uri="{BB962C8B-B14F-4D97-AF65-F5344CB8AC3E}">
         <p14:creationId xmlns:p14="http://schemas.microsoft.com/office/powerpoint/2010/main" val="1933891466"/>
+      </p:ext>
+    </p:extLst>
+  </p:cSld>
+  <p:clrMapOvr>
+    <a:masterClrMapping/>
+  </p:clrMapOvr>
+</p:sld>
+</file>
+
+<file path=ppt/slides/slide4.xml><?xml version="1.0" encoding="utf-8"?>
+<p:sld xmlns:a="http://schemas.openxmlformats.org/drawingml/2006/main" xmlns:r="http://schemas.openxmlformats.org/officeDocument/2006/relationships" xmlns:p="http://schemas.openxmlformats.org/presentationml/2006/main">
+  <p:cSld>
+    <p:spTree>
+      <p:nvGrpSpPr>
+        <p:cNvPr id="1" name=""/>
+        <p:cNvGrpSpPr/>
+        <p:nvPr/>
+      </p:nvGrpSpPr>
+      <p:grpSpPr>
+        <a:xfrm>
+          <a:off x="0" y="0"/>
+          <a:ext cx="0" cy="0"/>
+          <a:chOff x="0" y="0"/>
+          <a:chExt cx="0" cy="0"/>
+        </a:xfrm>
+      </p:grpSpPr>
+      <p:sp>
+        <p:nvSpPr>
+          <p:cNvPr id="2" name="标题 1"/>
+          <p:cNvSpPr>
+            <a:spLocks noGrp="1"/>
+          </p:cNvSpPr>
+          <p:nvPr>
+            <p:ph type="title"/>
+          </p:nvPr>
+        </p:nvSpPr>
+        <p:spPr/>
+        <p:txBody>
+          <a:bodyPr/>
+          <a:lstStyle/>
+          <a:p>
+            <a:r>
+              <a:rPr lang="en-US" dirty="0" smtClean="0"/>
+              <a:t>Simulations of Data Center Network(DCN)</a:t>
+            </a:r>
+            <a:endParaRPr lang="en-US" dirty="0"/>
+          </a:p>
+        </p:txBody>
+      </p:sp>
+      <p:pic>
+        <p:nvPicPr>
+          <p:cNvPr id="4" name="内容占位符 3"/>
+          <p:cNvPicPr>
+            <a:picLocks noGrp="1" noChangeAspect="1"/>
+          </p:cNvPicPr>
+          <p:nvPr>
+            <p:ph idx="1"/>
+          </p:nvPr>
+        </p:nvPicPr>
+        <p:blipFill>
+          <a:blip r:embed="rId2"/>
+          <a:stretch>
+            <a:fillRect/>
+          </a:stretch>
+        </p:blipFill>
+        <p:spPr>
+          <a:xfrm>
+            <a:off x="682618" y="1798320"/>
+            <a:ext cx="2327455" cy="4144963"/>
+          </a:xfrm>
+          <a:prstGeom prst="rect">
+            <a:avLst/>
+          </a:prstGeom>
+        </p:spPr>
+      </p:pic>
+      <p:pic>
+        <p:nvPicPr>
+          <p:cNvPr id="5" name="Content Placeholder 3" descr="AlFaresFatTree.png"/>
+          <p:cNvPicPr>
+            <a:picLocks noChangeAspect="1"/>
+          </p:cNvPicPr>
+          <p:nvPr/>
+        </p:nvPicPr>
+        <p:blipFill>
+          <a:blip r:embed="rId3" cstate="email">
+            <a:extLst>
+              <a:ext uri="{28A0092B-C50C-407E-A947-70E740481C1C}">
+                <a14:useLocalDpi xmlns:a14="http://schemas.microsoft.com/office/drawing/2010/main" val="0"/>
+              </a:ext>
+            </a:extLst>
+          </a:blip>
+          <a:srcRect t="-17332" b="-17332"/>
+          <a:stretch>
+            <a:fillRect/>
+          </a:stretch>
+        </p:blipFill>
+        <p:spPr>
+          <a:xfrm>
+            <a:off x="3457647" y="1600200"/>
+            <a:ext cx="3649190" cy="2001738"/>
+          </a:xfrm>
+          <a:prstGeom prst="rect">
+            <a:avLst/>
+          </a:prstGeom>
+        </p:spPr>
+      </p:pic>
+      <p:sp>
+        <p:nvSpPr>
+          <p:cNvPr id="6" name="文本框 5"/>
+          <p:cNvSpPr txBox="1"/>
+          <p:nvPr/>
+        </p:nvSpPr>
+        <p:spPr>
+          <a:xfrm>
+            <a:off x="3457647" y="3501469"/>
+            <a:ext cx="5305353" cy="2031325"/>
+          </a:xfrm>
+          <a:prstGeom prst="rect">
+            <a:avLst/>
+          </a:prstGeom>
+          <a:noFill/>
+        </p:spPr>
+        <p:txBody>
+          <a:bodyPr wrap="square" rtlCol="0">
+            <a:spAutoFit/>
+          </a:bodyPr>
+          <a:lstStyle/>
+          <a:p>
+            <a:pPr algn="just"/>
+            <a:r>
+              <a:rPr lang="en-US" altLang="zh-CN" sz="1400" dirty="0" smtClean="0"/>
+              <a:t>In this part, we applied naming rules that the paper mentioned by using Python. We built a same structure as the picture shows. Mainly, we have 4 pods, which contains 4*(4/2)^2 switches, and each Edge-layer switch links to 2 end host, each Aggregation-layer switch links to 2 lower layer switches and two upper layer switches – core switches. Plus, those switches and end hosts’ IP addresses are arranged by the algorithm in the paper. Then we will run some simulations using this DCN.</a:t>
+            </a:r>
+            <a:endParaRPr lang="en-US" sz="1400" dirty="0"/>
+          </a:p>
+        </p:txBody>
+      </p:sp>
+    </p:spTree>
+    <p:extLst>
+      <p:ext uri="{BB962C8B-B14F-4D97-AF65-F5344CB8AC3E}">
+        <p14:creationId xmlns:p14="http://schemas.microsoft.com/office/powerpoint/2010/main" val="4125127960"/>
+      </p:ext>
+    </p:extLst>
+  </p:cSld>
+  <p:clrMapOvr>
+    <a:masterClrMapping/>
+  </p:clrMapOvr>
+</p:sld>
+</file>
+
+<file path=ppt/slides/slide5.xml><?xml version="1.0" encoding="utf-8"?>
+<p:sld xmlns:a="http://schemas.openxmlformats.org/drawingml/2006/main" xmlns:r="http://schemas.openxmlformats.org/officeDocument/2006/relationships" xmlns:p="http://schemas.openxmlformats.org/presentationml/2006/main">
+  <p:cSld>
+    <p:spTree>
+      <p:nvGrpSpPr>
+        <p:cNvPr id="1" name=""/>
+        <p:cNvGrpSpPr/>
+        <p:nvPr/>
+      </p:nvGrpSpPr>
+      <p:grpSpPr>
+        <a:xfrm>
+          <a:off x="0" y="0"/>
+          <a:ext cx="0" cy="0"/>
+          <a:chOff x="0" y="0"/>
+          <a:chExt cx="0" cy="0"/>
+        </a:xfrm>
+      </p:grpSpPr>
+      <p:sp>
+        <p:nvSpPr>
+          <p:cNvPr id="2" name="标题 1"/>
+          <p:cNvSpPr>
+            <a:spLocks noGrp="1"/>
+          </p:cNvSpPr>
+          <p:nvPr>
+            <p:ph type="title"/>
+          </p:nvPr>
+        </p:nvSpPr>
+        <p:spPr>
+          <a:xfrm>
+            <a:off x="498474" y="484094"/>
+            <a:ext cx="7556313" cy="1116106"/>
+          </a:xfrm>
+        </p:spPr>
+        <p:txBody>
+          <a:bodyPr/>
+          <a:lstStyle/>
+          <a:p>
+            <a:r>
+              <a:rPr lang="en-US" dirty="0" smtClean="0"/>
+              <a:t>Routing Algorithm(1)</a:t>
+            </a:r>
+            <a:br>
+              <a:rPr lang="en-US" dirty="0" smtClean="0"/>
+            </a:br>
+            <a:r>
+              <a:rPr lang="en-US" dirty="0"/>
+              <a:t>	</a:t>
+            </a:r>
+            <a:r>
+              <a:rPr lang="en-US" sz="2400" dirty="0" smtClean="0"/>
+              <a:t>Establishment of Routing Tables</a:t>
+            </a:r>
+            <a:endParaRPr lang="en-US" dirty="0"/>
+          </a:p>
+        </p:txBody>
+      </p:sp>
+      <p:pic>
+        <p:nvPicPr>
+          <p:cNvPr id="4" name="内容占位符 3"/>
+          <p:cNvPicPr>
+            <a:picLocks noGrp="1" noChangeAspect="1"/>
+          </p:cNvPicPr>
+          <p:nvPr>
+            <p:ph idx="1"/>
+          </p:nvPr>
+        </p:nvPicPr>
+        <p:blipFill>
+          <a:blip r:embed="rId2"/>
+          <a:stretch>
+            <a:fillRect/>
+          </a:stretch>
+        </p:blipFill>
+        <p:spPr>
+          <a:xfrm>
+            <a:off x="545070" y="1803163"/>
+            <a:ext cx="1721475" cy="2074971"/>
+          </a:xfrm>
+          <a:prstGeom prst="rect">
+            <a:avLst/>
+          </a:prstGeom>
+        </p:spPr>
+      </p:pic>
+      <p:pic>
+        <p:nvPicPr>
+          <p:cNvPr id="5" name="图片 4"/>
+          <p:cNvPicPr>
+            <a:picLocks noChangeAspect="1"/>
+          </p:cNvPicPr>
+          <p:nvPr/>
+        </p:nvPicPr>
+        <p:blipFill>
+          <a:blip r:embed="rId3"/>
+          <a:stretch>
+            <a:fillRect/>
+          </a:stretch>
+        </p:blipFill>
+        <p:spPr>
+          <a:xfrm>
+            <a:off x="2557695" y="2224773"/>
+            <a:ext cx="1591131" cy="3306721"/>
+          </a:xfrm>
+          <a:prstGeom prst="rect">
+            <a:avLst/>
+          </a:prstGeom>
+        </p:spPr>
+      </p:pic>
+      <p:pic>
+        <p:nvPicPr>
+          <p:cNvPr id="6" name="图片 5"/>
+          <p:cNvPicPr>
+            <a:picLocks noChangeAspect="1"/>
+          </p:cNvPicPr>
+          <p:nvPr/>
+        </p:nvPicPr>
+        <p:blipFill>
+          <a:blip r:embed="rId4"/>
+          <a:stretch>
+            <a:fillRect/>
+          </a:stretch>
+        </p:blipFill>
+        <p:spPr>
+          <a:xfrm>
+            <a:off x="498474" y="4163229"/>
+            <a:ext cx="1781509" cy="1844919"/>
+          </a:xfrm>
+          <a:prstGeom prst="rect">
+            <a:avLst/>
+          </a:prstGeom>
+        </p:spPr>
+      </p:pic>
+      <p:sp>
+        <p:nvSpPr>
+          <p:cNvPr id="7" name="文本框 6"/>
+          <p:cNvSpPr txBox="1"/>
+          <p:nvPr/>
+        </p:nvSpPr>
+        <p:spPr>
+          <a:xfrm>
+            <a:off x="4792532" y="3544645"/>
+            <a:ext cx="2985247" cy="369332"/>
+          </a:xfrm>
+          <a:prstGeom prst="rect">
+            <a:avLst/>
+          </a:prstGeom>
+          <a:noFill/>
+        </p:spPr>
+        <p:txBody>
+          <a:bodyPr wrap="square" rtlCol="0">
+            <a:spAutoFit/>
+          </a:bodyPr>
+          <a:lstStyle/>
+          <a:p>
+            <a:r>
+              <a:rPr lang="en-US" dirty="0" smtClean="0"/>
+              <a:t>By GLH.</a:t>
+            </a:r>
+            <a:endParaRPr lang="en-US" dirty="0"/>
+          </a:p>
+        </p:txBody>
+      </p:sp>
+    </p:spTree>
+    <p:extLst>
+      <p:ext uri="{BB962C8B-B14F-4D97-AF65-F5344CB8AC3E}">
+        <p14:creationId xmlns:p14="http://schemas.microsoft.com/office/powerpoint/2010/main" val="2810170290"/>
+      </p:ext>
+    </p:extLst>
+  </p:cSld>
+  <p:clrMapOvr>
+    <a:masterClrMapping/>
+  </p:clrMapOvr>
+</p:sld>
+</file>
+
+<file path=ppt/slides/slide6.xml><?xml version="1.0" encoding="utf-8"?>
+<p:sld xmlns:a="http://schemas.openxmlformats.org/drawingml/2006/main" xmlns:r="http://schemas.openxmlformats.org/officeDocument/2006/relationships" xmlns:p="http://schemas.openxmlformats.org/presentationml/2006/main">
+  <p:cSld>
+    <p:spTree>
+      <p:nvGrpSpPr>
+        <p:cNvPr id="1" name=""/>
+        <p:cNvGrpSpPr/>
+        <p:nvPr/>
+      </p:nvGrpSpPr>
+      <p:grpSpPr>
+        <a:xfrm>
+          <a:off x="0" y="0"/>
+          <a:ext cx="0" cy="0"/>
+          <a:chOff x="0" y="0"/>
+          <a:chExt cx="0" cy="0"/>
+        </a:xfrm>
+      </p:grpSpPr>
+      <p:pic>
+        <p:nvPicPr>
+          <p:cNvPr id="5" name="内容占位符 4"/>
+          <p:cNvPicPr>
+            <a:picLocks noGrp="1" noChangeAspect="1"/>
+          </p:cNvPicPr>
+          <p:nvPr>
+            <p:ph idx="1"/>
+          </p:nvPr>
+        </p:nvPicPr>
+        <p:blipFill>
+          <a:blip r:embed="rId2"/>
+          <a:stretch>
+            <a:fillRect/>
+          </a:stretch>
+        </p:blipFill>
+        <p:spPr>
+          <a:xfrm>
+            <a:off x="389893" y="2029195"/>
+            <a:ext cx="4105305" cy="1090620"/>
+          </a:xfrm>
+          <a:prstGeom prst="rect">
+            <a:avLst/>
+          </a:prstGeom>
+        </p:spPr>
+      </p:pic>
+      <p:sp>
+        <p:nvSpPr>
+          <p:cNvPr id="4" name="标题 1"/>
+          <p:cNvSpPr>
+            <a:spLocks noGrp="1"/>
+          </p:cNvSpPr>
+          <p:nvPr>
+            <p:ph type="title"/>
+          </p:nvPr>
+        </p:nvSpPr>
+        <p:spPr/>
+        <p:txBody>
+          <a:bodyPr/>
+          <a:lstStyle/>
+          <a:p>
+            <a:r>
+              <a:rPr lang="en-US" dirty="0" smtClean="0"/>
+              <a:t>Routing Algorithm(2)</a:t>
+            </a:r>
+            <a:br>
+              <a:rPr lang="en-US" dirty="0" smtClean="0"/>
+            </a:br>
+            <a:r>
+              <a:rPr lang="en-US" dirty="0"/>
+              <a:t>	</a:t>
+            </a:r>
+            <a:r>
+              <a:rPr lang="en-US" sz="2400" dirty="0" smtClean="0"/>
+              <a:t>Applying Routing Algorithm</a:t>
+            </a:r>
+            <a:endParaRPr lang="en-US" dirty="0"/>
+          </a:p>
+        </p:txBody>
+      </p:sp>
+      <p:grpSp>
+        <p:nvGrpSpPr>
+          <p:cNvPr id="18" name="组合 17"/>
+          <p:cNvGrpSpPr/>
+          <p:nvPr/>
+        </p:nvGrpSpPr>
+        <p:grpSpPr>
+          <a:xfrm>
+            <a:off x="4319195" y="2820553"/>
+            <a:ext cx="4424082" cy="2145895"/>
+            <a:chOff x="3334871" y="2820553"/>
+            <a:chExt cx="5408406" cy="2966744"/>
+          </a:xfrm>
+        </p:grpSpPr>
+        <p:pic>
+          <p:nvPicPr>
+            <p:cNvPr id="6" name="Content Placeholder 3" descr="AlFaresFatTree.png"/>
+            <p:cNvPicPr>
+              <a:picLocks noChangeAspect="1"/>
+            </p:cNvPicPr>
+            <p:nvPr/>
+          </p:nvPicPr>
+          <p:blipFill>
+            <a:blip r:embed="rId3" cstate="email">
+              <a:extLst>
+                <a:ext uri="{28A0092B-C50C-407E-A947-70E740481C1C}">
+                  <a14:useLocalDpi xmlns:a14="http://schemas.microsoft.com/office/drawing/2010/main" val="0"/>
+                </a:ext>
+              </a:extLst>
+            </a:blip>
+            <a:srcRect t="-17332" b="-17332"/>
+            <a:stretch>
+              <a:fillRect/>
+            </a:stretch>
+          </p:blipFill>
+          <p:spPr>
+            <a:xfrm>
+              <a:off x="3334871" y="2820553"/>
+              <a:ext cx="5408406" cy="2966744"/>
+            </a:xfrm>
+            <a:prstGeom prst="rect">
+              <a:avLst/>
+            </a:prstGeom>
+          </p:spPr>
+        </p:pic>
+        <p:cxnSp>
+          <p:nvCxnSpPr>
+            <p:cNvPr id="8" name="直接箭头连接符 7"/>
+            <p:cNvCxnSpPr/>
+            <p:nvPr/>
+          </p:nvCxnSpPr>
+          <p:spPr>
+            <a:xfrm flipH="1" flipV="1">
+              <a:off x="3689873" y="4340711"/>
+              <a:ext cx="338866" cy="268941"/>
+            </a:xfrm>
+            <a:prstGeom prst="straightConnector1">
+              <a:avLst/>
+            </a:prstGeom>
+            <a:ln>
+              <a:tailEnd type="triangle"/>
+            </a:ln>
+          </p:spPr>
+          <p:style>
+            <a:lnRef idx="2">
+              <a:schemeClr val="dk1"/>
+            </a:lnRef>
+            <a:fillRef idx="0">
+              <a:schemeClr val="dk1"/>
+            </a:fillRef>
+            <a:effectRef idx="1">
+              <a:schemeClr val="dk1"/>
+            </a:effectRef>
+            <a:fontRef idx="minor">
+              <a:schemeClr val="tx1"/>
+            </a:fontRef>
+          </p:style>
+        </p:cxnSp>
+        <p:cxnSp>
+          <p:nvCxnSpPr>
+            <p:cNvPr id="9" name="直接箭头连接符 8"/>
+            <p:cNvCxnSpPr/>
+            <p:nvPr/>
+          </p:nvCxnSpPr>
+          <p:spPr>
+            <a:xfrm flipV="1">
+              <a:off x="3689873" y="3463962"/>
+              <a:ext cx="1694329" cy="797861"/>
+            </a:xfrm>
+            <a:prstGeom prst="straightConnector1">
+              <a:avLst/>
+            </a:prstGeom>
+            <a:ln>
+              <a:tailEnd type="triangle"/>
+            </a:ln>
+          </p:spPr>
+          <p:style>
+            <a:lnRef idx="2">
+              <a:schemeClr val="dk1"/>
+            </a:lnRef>
+            <a:fillRef idx="0">
+              <a:schemeClr val="dk1"/>
+            </a:fillRef>
+            <a:effectRef idx="1">
+              <a:schemeClr val="dk1"/>
+            </a:effectRef>
+            <a:fontRef idx="minor">
+              <a:schemeClr val="tx1"/>
+            </a:fontRef>
+          </p:style>
+        </p:cxnSp>
+        <p:cxnSp>
+          <p:nvCxnSpPr>
+            <p:cNvPr id="11" name="直接箭头连接符 10"/>
+            <p:cNvCxnSpPr/>
+            <p:nvPr/>
+          </p:nvCxnSpPr>
+          <p:spPr>
+            <a:xfrm>
+              <a:off x="5488193" y="3518746"/>
+              <a:ext cx="589878" cy="692873"/>
+            </a:xfrm>
+            <a:prstGeom prst="straightConnector1">
+              <a:avLst/>
+            </a:prstGeom>
+            <a:ln>
+              <a:tailEnd type="triangle"/>
+            </a:ln>
+          </p:spPr>
+          <p:style>
+            <a:lnRef idx="2">
+              <a:schemeClr val="dk1"/>
+            </a:lnRef>
+            <a:fillRef idx="0">
+              <a:schemeClr val="dk1"/>
+            </a:fillRef>
+            <a:effectRef idx="1">
+              <a:schemeClr val="dk1"/>
+            </a:effectRef>
+            <a:fontRef idx="minor">
+              <a:schemeClr val="tx1"/>
+            </a:fontRef>
+          </p:style>
+        </p:cxnSp>
+        <p:cxnSp>
+          <p:nvCxnSpPr>
+            <p:cNvPr id="13" name="直接箭头连接符 12"/>
+            <p:cNvCxnSpPr/>
+            <p:nvPr/>
+          </p:nvCxnSpPr>
+          <p:spPr>
+            <a:xfrm>
+              <a:off x="6105861" y="4342506"/>
+              <a:ext cx="0" cy="267146"/>
+            </a:xfrm>
+            <a:prstGeom prst="straightConnector1">
+              <a:avLst/>
+            </a:prstGeom>
+            <a:ln>
+              <a:tailEnd type="triangle"/>
+            </a:ln>
+          </p:spPr>
+          <p:style>
+            <a:lnRef idx="2">
+              <a:schemeClr val="dk1"/>
+            </a:lnRef>
+            <a:fillRef idx="0">
+              <a:schemeClr val="dk1"/>
+            </a:fillRef>
+            <a:effectRef idx="1">
+              <a:schemeClr val="dk1"/>
+            </a:effectRef>
+            <a:fontRef idx="minor">
+              <a:schemeClr val="tx1"/>
+            </a:fontRef>
+          </p:style>
+        </p:cxnSp>
+        <p:cxnSp>
+          <p:nvCxnSpPr>
+            <p:cNvPr id="15" name="直接箭头连接符 14"/>
+            <p:cNvCxnSpPr/>
+            <p:nvPr/>
+          </p:nvCxnSpPr>
+          <p:spPr>
+            <a:xfrm>
+              <a:off x="6124687" y="4699302"/>
+              <a:ext cx="77097" cy="267146"/>
+            </a:xfrm>
+            <a:prstGeom prst="straightConnector1">
+              <a:avLst/>
+            </a:prstGeom>
+            <a:ln>
+              <a:tailEnd type="triangle"/>
+            </a:ln>
+          </p:spPr>
+          <p:style>
+            <a:lnRef idx="2">
+              <a:schemeClr val="dk1"/>
+            </a:lnRef>
+            <a:fillRef idx="0">
+              <a:schemeClr val="dk1"/>
+            </a:fillRef>
+            <a:effectRef idx="1">
+              <a:schemeClr val="dk1"/>
+            </a:effectRef>
+            <a:fontRef idx="minor">
+              <a:schemeClr val="tx1"/>
+            </a:fontRef>
+          </p:style>
+        </p:cxnSp>
+      </p:grpSp>
+      <p:sp>
+        <p:nvSpPr>
+          <p:cNvPr id="17" name="文本框 16"/>
+          <p:cNvSpPr txBox="1"/>
+          <p:nvPr/>
+        </p:nvSpPr>
+        <p:spPr>
+          <a:xfrm>
+            <a:off x="263562" y="3316978"/>
+            <a:ext cx="3970568" cy="1754326"/>
+          </a:xfrm>
+          <a:prstGeom prst="rect">
+            <a:avLst/>
+          </a:prstGeom>
+          <a:noFill/>
+        </p:spPr>
+        <p:txBody>
+          <a:bodyPr wrap="square" rtlCol="0">
+            <a:spAutoFit/>
+          </a:bodyPr>
+          <a:lstStyle/>
+          <a:p>
+            <a:pPr algn="just"/>
+            <a:r>
+              <a:rPr lang="en-US" dirty="0" smtClean="0"/>
+              <a:t>We simulated the routing path from 10.0.1.2 to 10.2.0.3 using the routing algorithm mentioned in the paper.</a:t>
+            </a:r>
+          </a:p>
+          <a:p>
+            <a:pPr algn="just"/>
+            <a:endParaRPr lang="en-US" dirty="0"/>
+          </a:p>
+          <a:p>
+            <a:pPr algn="just"/>
+            <a:r>
+              <a:rPr lang="en-US" dirty="0" smtClean="0"/>
+              <a:t>BY GLH.</a:t>
+            </a:r>
+            <a:endParaRPr lang="en-US" dirty="0"/>
+          </a:p>
+        </p:txBody>
+      </p:sp>
+    </p:spTree>
+    <p:extLst>
+      <p:ext uri="{BB962C8B-B14F-4D97-AF65-F5344CB8AC3E}">
+        <p14:creationId xmlns:p14="http://schemas.microsoft.com/office/powerpoint/2010/main" val="710163963"/>
+      </p:ext>
+    </p:extLst>
+  </p:cSld>
+  <p:clrMapOvr>
+    <a:masterClrMapping/>
+  </p:clrMapOvr>
+</p:sld>
+</file>
+
+<file path=ppt/slides/slide7.xml><?xml version="1.0" encoding="utf-8"?>
+<p:sld xmlns:a="http://schemas.openxmlformats.org/drawingml/2006/main" xmlns:r="http://schemas.openxmlformats.org/officeDocument/2006/relationships" xmlns:p="http://schemas.openxmlformats.org/presentationml/2006/main">
+  <p:cSld>
+    <p:spTree>
+      <p:nvGrpSpPr>
+        <p:cNvPr id="1" name=""/>
+        <p:cNvGrpSpPr/>
+        <p:nvPr/>
+      </p:nvGrpSpPr>
+      <p:grpSpPr>
+        <a:xfrm>
+          <a:off x="0" y="0"/>
+          <a:ext cx="0" cy="0"/>
+          <a:chOff x="0" y="0"/>
+          <a:chExt cx="0" cy="0"/>
+        </a:xfrm>
+      </p:grpSpPr>
+      <p:sp>
+        <p:nvSpPr>
+          <p:cNvPr id="2" name="标题 1"/>
+          <p:cNvSpPr>
+            <a:spLocks noGrp="1"/>
+          </p:cNvSpPr>
+          <p:nvPr>
+            <p:ph type="title"/>
+          </p:nvPr>
+        </p:nvSpPr>
+        <p:spPr/>
+        <p:txBody>
+          <a:bodyPr/>
+          <a:lstStyle/>
+          <a:p>
+            <a:r>
+              <a:rPr lang="en-US" dirty="0" smtClean="0"/>
+              <a:t>Flow Classification</a:t>
+            </a:r>
+            <a:endParaRPr lang="en-US" dirty="0"/>
+          </a:p>
+        </p:txBody>
+      </p:sp>
+      <p:pic>
+        <p:nvPicPr>
+          <p:cNvPr id="4" name="内容占位符 3"/>
+          <p:cNvPicPr>
+            <a:picLocks noGrp="1" noChangeAspect="1"/>
+          </p:cNvPicPr>
+          <p:nvPr>
+            <p:ph idx="1"/>
+          </p:nvPr>
+        </p:nvPicPr>
+        <p:blipFill>
+          <a:blip r:embed="rId2"/>
+          <a:stretch>
+            <a:fillRect/>
+          </a:stretch>
+        </p:blipFill>
+        <p:spPr>
+          <a:xfrm>
+            <a:off x="498474" y="1600200"/>
+            <a:ext cx="3495701" cy="1809763"/>
+          </a:xfrm>
+          <a:prstGeom prst="rect">
+            <a:avLst/>
+          </a:prstGeom>
+        </p:spPr>
+      </p:pic>
+    </p:spTree>
+    <p:extLst>
+      <p:ext uri="{BB962C8B-B14F-4D97-AF65-F5344CB8AC3E}">
+        <p14:creationId xmlns:p14="http://schemas.microsoft.com/office/powerpoint/2010/main" val="3915293230"/>
       </p:ext>
     </p:extLst>
   </p:cSld>

</xml_diff>

<commit_message>
Addtions to PPTs and chages on code
</commit_message>
<xml_diff>
--- a/Presentation/presentation.pptx
+++ b/Presentation/presentation.pptx
@@ -5,7 +5,7 @@
     <p:sldMasterId id="2147483998" r:id="rId1"/>
   </p:sldMasterIdLst>
   <p:notesMasterIdLst>
-    <p:notesMasterId r:id="rId9"/>
+    <p:notesMasterId r:id="rId10"/>
   </p:notesMasterIdLst>
   <p:sldIdLst>
     <p:sldId id="256" r:id="rId2"/>
@@ -15,6 +15,7 @@
     <p:sldId id="260" r:id="rId6"/>
     <p:sldId id="261" r:id="rId7"/>
     <p:sldId id="262" r:id="rId8"/>
+    <p:sldId id="263" r:id="rId9"/>
   </p:sldIdLst>
   <p:sldSz cx="9144000" cy="6858000" type="screen4x3"/>
   <p:notesSz cx="7010400" cy="9296400"/>
@@ -9613,10 +9614,10 @@
         </p:nvGrpSpPr>
         <p:grpSpPr>
           <a:xfrm>
-            <a:off x="4319195" y="2820553"/>
-            <a:ext cx="4424082" cy="2145895"/>
-            <a:chOff x="3334871" y="2820553"/>
-            <a:chExt cx="5408406" cy="2966744"/>
+            <a:off x="4495198" y="2435192"/>
+            <a:ext cx="4213907" cy="2088682"/>
+            <a:chOff x="3334871" y="3179360"/>
+            <a:chExt cx="5408406" cy="2322095"/>
           </a:xfrm>
         </p:grpSpPr>
         <p:pic>
@@ -9627,7 +9628,7 @@
             </p:cNvPicPr>
             <p:nvPr/>
           </p:nvPicPr>
-          <p:blipFill>
+          <p:blipFill rotWithShape="1">
             <a:blip r:embed="rId3" cstate="email">
               <a:extLst>
                 <a:ext uri="{28A0092B-C50C-407E-A947-70E740481C1C}">
@@ -9635,15 +9636,13 @@
                 </a:ext>
               </a:extLst>
             </a:blip>
-            <a:srcRect t="-17332" b="-17332"/>
-            <a:stretch>
-              <a:fillRect/>
-            </a:stretch>
+            <a:srcRect t="-1045" b="-4357"/>
+            <a:stretch/>
           </p:blipFill>
           <p:spPr>
             <a:xfrm>
-              <a:off x="3334871" y="2820553"/>
-              <a:ext cx="5408406" cy="2966744"/>
+              <a:off x="3334871" y="3179360"/>
+              <a:ext cx="5408406" cy="2322095"/>
             </a:xfrm>
             <a:prstGeom prst="rect">
               <a:avLst/>
@@ -9905,21 +9904,82 @@
           <a:p>
             <a:r>
               <a:rPr lang="en-US" dirty="0" smtClean="0"/>
-              <a:t>Flow Classification</a:t>
-            </a:r>
+              <a:t>Flow Classification &amp; Scheduling</a:t>
+            </a:r>
+            <a:endParaRPr lang="en-US" dirty="0"/>
+          </a:p>
+        </p:txBody>
+      </p:sp>
+      <p:sp>
+        <p:nvSpPr>
+          <p:cNvPr id="3" name="文本框 2"/>
+          <p:cNvSpPr txBox="1"/>
+          <p:nvPr/>
+        </p:nvSpPr>
+        <p:spPr>
+          <a:xfrm>
+            <a:off x="4276630" y="2346755"/>
+            <a:ext cx="3806791" cy="2954655"/>
+          </a:xfrm>
+          <a:prstGeom prst="rect">
+            <a:avLst/>
+          </a:prstGeom>
+          <a:noFill/>
+        </p:spPr>
+        <p:txBody>
+          <a:bodyPr wrap="square" rtlCol="0">
+            <a:spAutoFit/>
+          </a:bodyPr>
+          <a:lstStyle/>
+          <a:p>
+            <a:pPr algn="just"/>
+            <a:r>
+              <a:rPr lang="en-US" sz="1400" dirty="0" smtClean="0"/>
+              <a:t>We also ran several simulations on flow classification.</a:t>
+            </a:r>
+          </a:p>
+          <a:p>
+            <a:pPr lvl="0" algn="just" fontAlgn="base"/>
+            <a:r>
+              <a:rPr lang="en-US" sz="1400" dirty="0" smtClean="0"/>
+              <a:t>When there is a new flow coming, we  can run the flow classification algorithm in order to :</a:t>
+            </a:r>
+          </a:p>
+          <a:p>
+            <a:pPr lvl="0" algn="just" fontAlgn="base"/>
+            <a:r>
+              <a:rPr lang="en-US" sz="1400" dirty="0" smtClean="0"/>
+              <a:t>1.Recognize </a:t>
+            </a:r>
+            <a:r>
+              <a:rPr lang="en-US" sz="1400" dirty="0"/>
+              <a:t>subsequent packets of the same flow, and forward them on the same outgoing port.</a:t>
+            </a:r>
+          </a:p>
+          <a:p>
+            <a:pPr lvl="0" algn="just" fontAlgn="base"/>
+            <a:r>
+              <a:rPr lang="en-US" sz="1400" dirty="0" smtClean="0"/>
+              <a:t>2.Periodically </a:t>
+            </a:r>
+            <a:r>
+              <a:rPr lang="en-US" sz="1400" dirty="0"/>
+              <a:t>reassign a minimal number of flow output ports to minimize any disparity between the aggregate flow capacity of different ports.</a:t>
+            </a:r>
+          </a:p>
+          <a:p>
+            <a:pPr algn="just"/>
             <a:endParaRPr lang="en-US" dirty="0"/>
           </a:p>
         </p:txBody>
       </p:sp>
       <p:pic>
         <p:nvPicPr>
-          <p:cNvPr id="4" name="内容占位符 3"/>
+          <p:cNvPr id="5" name="图片 4"/>
           <p:cNvPicPr>
-            <a:picLocks noGrp="1" noChangeAspect="1"/>
+            <a:picLocks noChangeAspect="1"/>
           </p:cNvPicPr>
-          <p:nvPr>
-            <p:ph idx="1"/>
-          </p:nvPr>
+          <p:nvPr/>
         </p:nvPicPr>
         <p:blipFill>
           <a:blip r:embed="rId2"/>
@@ -9929,8 +9989,8 @@
         </p:blipFill>
         <p:spPr>
           <a:xfrm>
-            <a:off x="498474" y="1600200"/>
-            <a:ext cx="3495701" cy="1809763"/>
+            <a:off x="389823" y="2098406"/>
+            <a:ext cx="3886807" cy="3451355"/>
           </a:xfrm>
           <a:prstGeom prst="rect">
             <a:avLst/>
@@ -9941,6 +10001,258 @@
     <p:extLst>
       <p:ext uri="{BB962C8B-B14F-4D97-AF65-F5344CB8AC3E}">
         <p14:creationId xmlns:p14="http://schemas.microsoft.com/office/powerpoint/2010/main" val="3915293230"/>
+      </p:ext>
+    </p:extLst>
+  </p:cSld>
+  <p:clrMapOvr>
+    <a:masterClrMapping/>
+  </p:clrMapOvr>
+</p:sld>
+</file>
+
+<file path=ppt/slides/slide8.xml><?xml version="1.0" encoding="utf-8"?>
+<p:sld xmlns:a="http://schemas.openxmlformats.org/drawingml/2006/main" xmlns:r="http://schemas.openxmlformats.org/officeDocument/2006/relationships" xmlns:p="http://schemas.openxmlformats.org/presentationml/2006/main">
+  <p:cSld>
+    <p:spTree>
+      <p:nvGrpSpPr>
+        <p:cNvPr id="1" name=""/>
+        <p:cNvGrpSpPr/>
+        <p:nvPr/>
+      </p:nvGrpSpPr>
+      <p:grpSpPr>
+        <a:xfrm>
+          <a:off x="0" y="0"/>
+          <a:ext cx="0" cy="0"/>
+          <a:chOff x="0" y="0"/>
+          <a:chExt cx="0" cy="0"/>
+        </a:xfrm>
+      </p:grpSpPr>
+      <p:sp>
+        <p:nvSpPr>
+          <p:cNvPr id="2" name="标题 1"/>
+          <p:cNvSpPr>
+            <a:spLocks noGrp="1"/>
+          </p:cNvSpPr>
+          <p:nvPr>
+            <p:ph type="title"/>
+          </p:nvPr>
+        </p:nvSpPr>
+        <p:spPr/>
+        <p:txBody>
+          <a:bodyPr/>
+          <a:lstStyle/>
+          <a:p>
+            <a:r>
+              <a:rPr lang="en-US" altLang="zh-CN" dirty="0"/>
+              <a:t>Overview</a:t>
+            </a:r>
+            <a:r>
+              <a:rPr lang="zh-CN" altLang="en-US" dirty="0"/>
+              <a:t> </a:t>
+            </a:r>
+            <a:r>
+              <a:rPr lang="en-US" altLang="zh-CN" dirty="0"/>
+              <a:t>of</a:t>
+            </a:r>
+            <a:r>
+              <a:rPr lang="zh-CN" altLang="en-US" dirty="0"/>
+              <a:t> </a:t>
+            </a:r>
+            <a:r>
+              <a:rPr lang="en-US" altLang="zh-CN" dirty="0"/>
+              <a:t>Future</a:t>
+            </a:r>
+            <a:r>
+              <a:rPr lang="zh-CN" altLang="en-US" dirty="0"/>
+              <a:t> </a:t>
+            </a:r>
+            <a:r>
+              <a:rPr lang="en-US" altLang="zh-CN" dirty="0"/>
+              <a:t>Perspectives</a:t>
+            </a:r>
+            <a:endParaRPr lang="en-US" dirty="0"/>
+          </a:p>
+        </p:txBody>
+      </p:sp>
+      <p:sp>
+        <p:nvSpPr>
+          <p:cNvPr id="3" name="内容占位符 2"/>
+          <p:cNvSpPr>
+            <a:spLocks noGrp="1"/>
+          </p:cNvSpPr>
+          <p:nvPr>
+            <p:ph idx="1"/>
+          </p:nvPr>
+        </p:nvSpPr>
+        <p:spPr/>
+        <p:txBody>
+          <a:bodyPr/>
+          <a:lstStyle/>
+          <a:p>
+            <a:pPr lvl="2"/>
+            <a:r>
+              <a:rPr lang="en-US" dirty="0" smtClean="0"/>
+              <a:t>Fat-Tree &amp; VL2: center on switches.</a:t>
+            </a:r>
+          </a:p>
+          <a:p>
+            <a:pPr lvl="2"/>
+            <a:r>
+              <a:rPr lang="en-US" dirty="0" smtClean="0"/>
+              <a:t>New Architectures: </a:t>
+            </a:r>
+            <a:r>
+              <a:rPr lang="en-US" dirty="0" err="1" smtClean="0"/>
+              <a:t>Dcell</a:t>
+            </a:r>
+            <a:r>
+              <a:rPr lang="en-US" dirty="0" smtClean="0"/>
+              <a:t>, </a:t>
+            </a:r>
+            <a:r>
+              <a:rPr lang="en-US" dirty="0" err="1" smtClean="0"/>
+              <a:t>FiConn</a:t>
+            </a:r>
+            <a:r>
+              <a:rPr lang="en-US" dirty="0" smtClean="0"/>
+              <a:t>, </a:t>
+            </a:r>
+            <a:r>
+              <a:rPr lang="en-US" dirty="0" err="1" smtClean="0"/>
+              <a:t>Bcube</a:t>
+            </a:r>
+            <a:r>
+              <a:rPr lang="en-US" dirty="0" smtClean="0"/>
+              <a:t>: center on server.</a:t>
+            </a:r>
+          </a:p>
+          <a:p>
+            <a:pPr lvl="2"/>
+            <a:endParaRPr lang="en-US" dirty="0"/>
+          </a:p>
+          <a:p>
+            <a:pPr lvl="2"/>
+            <a:endParaRPr lang="en-US" dirty="0" smtClean="0"/>
+          </a:p>
+        </p:txBody>
+      </p:sp>
+      <p:sp>
+        <p:nvSpPr>
+          <p:cNvPr id="4" name="矩形 3"/>
+          <p:cNvSpPr/>
+          <p:nvPr/>
+        </p:nvSpPr>
+        <p:spPr>
+          <a:xfrm>
+            <a:off x="498474" y="6397129"/>
+            <a:ext cx="7556313" cy="400110"/>
+          </a:xfrm>
+          <a:prstGeom prst="rect">
+            <a:avLst/>
+          </a:prstGeom>
+        </p:spPr>
+        <p:txBody>
+          <a:bodyPr wrap="square">
+            <a:spAutoFit/>
+          </a:bodyPr>
+          <a:lstStyle/>
+          <a:p>
+            <a:r>
+              <a:rPr lang="en-US" sz="1000" dirty="0" err="1"/>
+              <a:t>Guo</a:t>
+            </a:r>
+            <a:r>
+              <a:rPr lang="en-US" sz="1000" dirty="0"/>
+              <a:t> C, Lu G, Li D, Wu H, Zhang X, Shi Y, Tian C, Zhang Y, Lu S. BCube: A high performance, server-centric network architecture for modular data centers. In: Proc. of the SIGCOMM. 2009. 63-74 .</a:t>
+            </a:r>
+          </a:p>
+        </p:txBody>
+      </p:sp>
+      <p:pic>
+        <p:nvPicPr>
+          <p:cNvPr id="5" name="图片 4"/>
+          <p:cNvPicPr>
+            <a:picLocks noChangeAspect="1"/>
+          </p:cNvPicPr>
+          <p:nvPr/>
+        </p:nvPicPr>
+        <p:blipFill>
+          <a:blip r:embed="rId2"/>
+          <a:stretch>
+            <a:fillRect/>
+          </a:stretch>
+        </p:blipFill>
+        <p:spPr>
+          <a:xfrm>
+            <a:off x="1304930" y="2804201"/>
+            <a:ext cx="5943399" cy="1794117"/>
+          </a:xfrm>
+          <a:prstGeom prst="rect">
+            <a:avLst/>
+          </a:prstGeom>
+        </p:spPr>
+      </p:pic>
+      <p:pic>
+        <p:nvPicPr>
+          <p:cNvPr id="6" name="图片 5"/>
+          <p:cNvPicPr>
+            <a:picLocks noChangeAspect="1"/>
+          </p:cNvPicPr>
+          <p:nvPr/>
+        </p:nvPicPr>
+        <p:blipFill>
+          <a:blip r:embed="rId3"/>
+          <a:stretch>
+            <a:fillRect/>
+          </a:stretch>
+        </p:blipFill>
+        <p:spPr>
+          <a:xfrm>
+            <a:off x="1304930" y="4699690"/>
+            <a:ext cx="2189396" cy="1697439"/>
+          </a:xfrm>
+          <a:prstGeom prst="rect">
+            <a:avLst/>
+          </a:prstGeom>
+        </p:spPr>
+      </p:pic>
+      <p:sp>
+        <p:nvSpPr>
+          <p:cNvPr id="7" name="文本框 6"/>
+          <p:cNvSpPr txBox="1"/>
+          <p:nvPr/>
+        </p:nvSpPr>
+        <p:spPr>
+          <a:xfrm>
+            <a:off x="3604660" y="6221282"/>
+            <a:ext cx="4177365" cy="261610"/>
+          </a:xfrm>
+          <a:prstGeom prst="rect">
+            <a:avLst/>
+          </a:prstGeom>
+          <a:noFill/>
+        </p:spPr>
+        <p:txBody>
+          <a:bodyPr wrap="square" rtlCol="0">
+            <a:spAutoFit/>
+          </a:bodyPr>
+          <a:lstStyle/>
+          <a:p>
+            <a:r>
+              <a:rPr lang="en-US" sz="1100" dirty="0" smtClean="0"/>
+              <a:t>Image Source: </a:t>
+            </a:r>
+            <a:r>
+              <a:rPr lang="en-US" sz="1100" dirty="0"/>
+              <a:t>http://www.jos.org.cn/html/2014/6/4444.htm</a:t>
+            </a:r>
+          </a:p>
+        </p:txBody>
+      </p:sp>
+    </p:spTree>
+    <p:extLst>
+      <p:ext uri="{BB962C8B-B14F-4D97-AF65-F5344CB8AC3E}">
+        <p14:creationId xmlns:p14="http://schemas.microsoft.com/office/powerpoint/2010/main" val="2681245345"/>
       </p:ext>
     </p:extLst>
   </p:cSld>

</xml_diff>